<commit_message>
Merged chunks to have a bootstraped jquery instance.
</commit_message>
<xml_diff>
--- a/bootstrap/Bootstrap.pptx
+++ b/bootstrap/Bootstrap.pptx
@@ -6,6 +6,12 @@
   </p:sldMasterIdLst>
   <p:sldIdLst>
     <p:sldId id="256" r:id="rId2"/>
+    <p:sldId id="257" r:id="rId3"/>
+    <p:sldId id="259" r:id="rId4"/>
+    <p:sldId id="258" r:id="rId5"/>
+    <p:sldId id="260" r:id="rId6"/>
+    <p:sldId id="261" r:id="rId7"/>
+    <p:sldId id="262" r:id="rId8"/>
   </p:sldIdLst>
   <p:sldSz cx="12192000" cy="6858000"/>
   <p:notesSz cx="6858000" cy="9144000"/>
@@ -7765,6 +7771,766 @@
   <p:clrMapOvr>
     <a:masterClrMapping/>
   </p:clrMapOvr>
+  <p:timing>
+    <p:tnLst>
+      <p:par>
+        <p:cTn id="1" dur="indefinite" restart="never" nodeType="tmRoot"/>
+      </p:par>
+    </p:tnLst>
+  </p:timing>
+</p:sld>
+</file>
+
+<file path=ppt/slides/slide2.xml><?xml version="1.0" encoding="utf-8"?>
+<p:sld xmlns:a="http://schemas.openxmlformats.org/drawingml/2006/main" xmlns:r="http://schemas.openxmlformats.org/officeDocument/2006/relationships" xmlns:p="http://schemas.openxmlformats.org/presentationml/2006/main">
+  <p:cSld>
+    <p:spTree>
+      <p:nvGrpSpPr>
+        <p:cNvPr id="1" name=""/>
+        <p:cNvGrpSpPr/>
+        <p:nvPr/>
+      </p:nvGrpSpPr>
+      <p:grpSpPr>
+        <a:xfrm>
+          <a:off x="0" y="0"/>
+          <a:ext cx="0" cy="0"/>
+          <a:chOff x="0" y="0"/>
+          <a:chExt cx="0" cy="0"/>
+        </a:xfrm>
+      </p:grpSpPr>
+      <p:sp>
+        <p:nvSpPr>
+          <p:cNvPr id="2" name="Title 1"/>
+          <p:cNvSpPr>
+            <a:spLocks noGrp="1"/>
+          </p:cNvSpPr>
+          <p:nvPr>
+            <p:ph type="title"/>
+          </p:nvPr>
+        </p:nvSpPr>
+        <p:spPr/>
+        <p:txBody>
+          <a:bodyPr/>
+          <a:lstStyle/>
+          <a:p>
+            <a:r>
+              <a:rPr lang="en-US" dirty="0" smtClean="0"/>
+              <a:t>Bootstrap offers </a:t>
+            </a:r>
+            <a:endParaRPr lang="en-US" dirty="0"/>
+          </a:p>
+        </p:txBody>
+      </p:sp>
+      <p:sp>
+        <p:nvSpPr>
+          <p:cNvPr id="5" name="Content Placeholder 4"/>
+          <p:cNvSpPr>
+            <a:spLocks noGrp="1"/>
+          </p:cNvSpPr>
+          <p:nvPr>
+            <p:ph idx="1"/>
+          </p:nvPr>
+        </p:nvSpPr>
+        <p:spPr/>
+        <p:txBody>
+          <a:bodyPr/>
+          <a:lstStyle/>
+          <a:p>
+            <a:r>
+              <a:rPr lang="en-US" dirty="0" smtClean="0"/>
+              <a:t>UI components</a:t>
+            </a:r>
+          </a:p>
+          <a:p>
+            <a:r>
+              <a:rPr lang="en-US" dirty="0" smtClean="0"/>
+              <a:t>Grid system</a:t>
+            </a:r>
+          </a:p>
+          <a:p>
+            <a:r>
+              <a:rPr lang="en-US" dirty="0" smtClean="0"/>
+              <a:t>Class utilities</a:t>
+            </a:r>
+          </a:p>
+          <a:p>
+            <a:r>
+              <a:rPr lang="en-US" dirty="0" smtClean="0"/>
+              <a:t>Icons</a:t>
+            </a:r>
+          </a:p>
+          <a:p>
+            <a:r>
+              <a:rPr lang="en-US" dirty="0" smtClean="0"/>
+              <a:t>SASS utilities </a:t>
+            </a:r>
+          </a:p>
+          <a:p>
+            <a:r>
+              <a:rPr lang="en-US" dirty="0" smtClean="0"/>
+              <a:t>Themes</a:t>
+            </a:r>
+          </a:p>
+          <a:p>
+            <a:r>
+              <a:rPr lang="pl-PL" dirty="0" smtClean="0"/>
+              <a:t>Esy customization</a:t>
+            </a:r>
+            <a:endParaRPr lang="en-US" dirty="0" smtClean="0"/>
+          </a:p>
+          <a:p>
+            <a:endParaRPr lang="en-US" dirty="0"/>
+          </a:p>
+        </p:txBody>
+      </p:sp>
+    </p:spTree>
+    <p:extLst>
+      <p:ext uri="{BB962C8B-B14F-4D97-AF65-F5344CB8AC3E}">
+        <p14:creationId xmlns:p14="http://schemas.microsoft.com/office/powerpoint/2010/main" val="256691531"/>
+      </p:ext>
+    </p:extLst>
+  </p:cSld>
+  <p:clrMapOvr>
+    <a:masterClrMapping/>
+  </p:clrMapOvr>
+  <p:timing>
+    <p:tnLst>
+      <p:par>
+        <p:cTn id="1" dur="indefinite" restart="never" nodeType="tmRoot"/>
+      </p:par>
+    </p:tnLst>
+  </p:timing>
+</p:sld>
+</file>
+
+<file path=ppt/slides/slide3.xml><?xml version="1.0" encoding="utf-8"?>
+<p:sld xmlns:a="http://schemas.openxmlformats.org/drawingml/2006/main" xmlns:r="http://schemas.openxmlformats.org/officeDocument/2006/relationships" xmlns:p="http://schemas.openxmlformats.org/presentationml/2006/main">
+  <p:cSld>
+    <p:spTree>
+      <p:nvGrpSpPr>
+        <p:cNvPr id="1" name=""/>
+        <p:cNvGrpSpPr/>
+        <p:nvPr/>
+      </p:nvGrpSpPr>
+      <p:grpSpPr>
+        <a:xfrm>
+          <a:off x="0" y="0"/>
+          <a:ext cx="0" cy="0"/>
+          <a:chOff x="0" y="0"/>
+          <a:chExt cx="0" cy="0"/>
+        </a:xfrm>
+      </p:grpSpPr>
+      <p:sp>
+        <p:nvSpPr>
+          <p:cNvPr id="2" name="Title 1"/>
+          <p:cNvSpPr>
+            <a:spLocks noGrp="1"/>
+          </p:cNvSpPr>
+          <p:nvPr>
+            <p:ph type="title"/>
+          </p:nvPr>
+        </p:nvSpPr>
+        <p:spPr/>
+        <p:txBody>
+          <a:bodyPr/>
+          <a:lstStyle/>
+          <a:p>
+            <a:r>
+              <a:rPr lang="en-US" dirty="0" smtClean="0"/>
+              <a:t>Bootstrap 4</a:t>
+            </a:r>
+            <a:endParaRPr lang="en-US" dirty="0"/>
+          </a:p>
+        </p:txBody>
+      </p:sp>
+      <p:sp>
+        <p:nvSpPr>
+          <p:cNvPr id="3" name="Content Placeholder 2"/>
+          <p:cNvSpPr>
+            <a:spLocks noGrp="1"/>
+          </p:cNvSpPr>
+          <p:nvPr>
+            <p:ph idx="1"/>
+          </p:nvPr>
+        </p:nvSpPr>
+        <p:spPr/>
+        <p:txBody>
+          <a:bodyPr>
+            <a:normAutofit fontScale="92500" lnSpcReduction="10000"/>
+          </a:bodyPr>
+          <a:lstStyle/>
+          <a:p>
+            <a:r>
+              <a:rPr lang="en-US" dirty="0" smtClean="0"/>
+              <a:t>Made with SASS</a:t>
+            </a:r>
+          </a:p>
+          <a:p>
+            <a:r>
+              <a:rPr lang="en-US" dirty="0" smtClean="0"/>
+              <a:t>Has grid system based on “</a:t>
+            </a:r>
+            <a:r>
+              <a:rPr lang="en-US" dirty="0" err="1" smtClean="0"/>
+              <a:t>rem”s</a:t>
+            </a:r>
+            <a:endParaRPr lang="en-US" dirty="0" smtClean="0"/>
+          </a:p>
+          <a:p>
+            <a:r>
+              <a:rPr lang="en-US" dirty="0" smtClean="0"/>
+              <a:t>Grid system can use Flex Box optionally</a:t>
+            </a:r>
+          </a:p>
+          <a:p>
+            <a:r>
+              <a:rPr lang="en-US" dirty="0" smtClean="0"/>
+              <a:t>Has no icons</a:t>
+            </a:r>
+          </a:p>
+          <a:p>
+            <a:r>
+              <a:rPr lang="en-US" dirty="0" smtClean="0"/>
+              <a:t>Card component replaces Panels and Wells</a:t>
+            </a:r>
+          </a:p>
+          <a:p>
+            <a:r>
+              <a:rPr lang="en-US" dirty="0" smtClean="0"/>
+              <a:t>Customization with SASS variables out of the box</a:t>
+            </a:r>
+          </a:p>
+          <a:p>
+            <a:r>
+              <a:rPr lang="en-US" dirty="0" smtClean="0"/>
+              <a:t>ES6 support</a:t>
+            </a:r>
+          </a:p>
+          <a:p>
+            <a:r>
+              <a:rPr lang="en-US" dirty="0" smtClean="0"/>
+              <a:t>IE8 support dropped</a:t>
+            </a:r>
+          </a:p>
+          <a:p>
+            <a:r>
+              <a:rPr lang="en-US" dirty="0" smtClean="0"/>
+              <a:t>Tether library added as a dependency for Tooltips and Popovers</a:t>
+            </a:r>
+          </a:p>
+          <a:p>
+            <a:endParaRPr lang="en-US" dirty="0" smtClean="0"/>
+          </a:p>
+          <a:p>
+            <a:endParaRPr lang="en-US" dirty="0"/>
+          </a:p>
+        </p:txBody>
+      </p:sp>
+    </p:spTree>
+    <p:extLst>
+      <p:ext uri="{BB962C8B-B14F-4D97-AF65-F5344CB8AC3E}">
+        <p14:creationId xmlns:p14="http://schemas.microsoft.com/office/powerpoint/2010/main" val="209867439"/>
+      </p:ext>
+    </p:extLst>
+  </p:cSld>
+  <p:clrMapOvr>
+    <a:masterClrMapping/>
+  </p:clrMapOvr>
+  <p:timing>
+    <p:tnLst>
+      <p:par>
+        <p:cTn id="1" dur="indefinite" restart="never" nodeType="tmRoot"/>
+      </p:par>
+    </p:tnLst>
+  </p:timing>
+</p:sld>
+</file>
+
+<file path=ppt/slides/slide4.xml><?xml version="1.0" encoding="utf-8"?>
+<p:sld xmlns:a="http://schemas.openxmlformats.org/drawingml/2006/main" xmlns:r="http://schemas.openxmlformats.org/officeDocument/2006/relationships" xmlns:p="http://schemas.openxmlformats.org/presentationml/2006/main">
+  <p:cSld>
+    <p:spTree>
+      <p:nvGrpSpPr>
+        <p:cNvPr id="1" name=""/>
+        <p:cNvGrpSpPr/>
+        <p:nvPr/>
+      </p:nvGrpSpPr>
+      <p:grpSpPr>
+        <a:xfrm>
+          <a:off x="0" y="0"/>
+          <a:ext cx="0" cy="0"/>
+          <a:chOff x="0" y="0"/>
+          <a:chExt cx="0" cy="0"/>
+        </a:xfrm>
+      </p:grpSpPr>
+      <p:sp>
+        <p:nvSpPr>
+          <p:cNvPr id="2" name="Title 1"/>
+          <p:cNvSpPr>
+            <a:spLocks noGrp="1"/>
+          </p:cNvSpPr>
+          <p:nvPr>
+            <p:ph type="title"/>
+          </p:nvPr>
+        </p:nvSpPr>
+        <p:spPr/>
+        <p:txBody>
+          <a:bodyPr/>
+          <a:lstStyle/>
+          <a:p>
+            <a:r>
+              <a:rPr lang="en-US" dirty="0" smtClean="0"/>
+              <a:t>Alternatives</a:t>
+            </a:r>
+            <a:endParaRPr lang="en-US" dirty="0"/>
+          </a:p>
+        </p:txBody>
+      </p:sp>
+      <p:pic>
+        <p:nvPicPr>
+          <p:cNvPr id="4" name="Content Placeholder 3"/>
+          <p:cNvPicPr>
+            <a:picLocks noGrp="1" noChangeAspect="1"/>
+          </p:cNvPicPr>
+          <p:nvPr>
+            <p:ph idx="1"/>
+          </p:nvPr>
+        </p:nvPicPr>
+        <p:blipFill>
+          <a:blip r:embed="rId2">
+            <a:extLst>
+              <a:ext uri="{28A0092B-C50C-407E-A947-70E740481C1C}">
+                <a14:useLocalDpi xmlns:a14="http://schemas.microsoft.com/office/drawing/2010/main" val="0"/>
+              </a:ext>
+            </a:extLst>
+          </a:blip>
+          <a:stretch>
+            <a:fillRect/>
+          </a:stretch>
+        </p:blipFill>
+        <p:spPr>
+          <a:xfrm>
+            <a:off x="977179" y="2276547"/>
+            <a:ext cx="3405976" cy="1214798"/>
+          </a:xfrm>
+        </p:spPr>
+      </p:pic>
+      <p:pic>
+        <p:nvPicPr>
+          <p:cNvPr id="7" name="Picture 6"/>
+          <p:cNvPicPr>
+            <a:picLocks noChangeAspect="1"/>
+          </p:cNvPicPr>
+          <p:nvPr/>
+        </p:nvPicPr>
+        <p:blipFill>
+          <a:blip r:embed="rId3">
+            <a:extLst>
+              <a:ext uri="{28A0092B-C50C-407E-A947-70E740481C1C}">
+                <a14:useLocalDpi xmlns:a14="http://schemas.microsoft.com/office/drawing/2010/main" val="0"/>
+              </a:ext>
+            </a:extLst>
+          </a:blip>
+          <a:stretch>
+            <a:fillRect/>
+          </a:stretch>
+        </p:blipFill>
+        <p:spPr>
+          <a:xfrm>
+            <a:off x="7654059" y="2276547"/>
+            <a:ext cx="3238500" cy="2095500"/>
+          </a:xfrm>
+          <a:prstGeom prst="rect">
+            <a:avLst/>
+          </a:prstGeom>
+        </p:spPr>
+      </p:pic>
+      <p:pic>
+        <p:nvPicPr>
+          <p:cNvPr id="8" name="Picture 7"/>
+          <p:cNvPicPr>
+            <a:picLocks noChangeAspect="1"/>
+          </p:cNvPicPr>
+          <p:nvPr/>
+        </p:nvPicPr>
+        <p:blipFill>
+          <a:blip r:embed="rId4">
+            <a:extLst>
+              <a:ext uri="{28A0092B-C50C-407E-A947-70E740481C1C}">
+                <a14:useLocalDpi xmlns:a14="http://schemas.microsoft.com/office/drawing/2010/main" val="0"/>
+              </a:ext>
+            </a:extLst>
+          </a:blip>
+          <a:stretch>
+            <a:fillRect/>
+          </a:stretch>
+        </p:blipFill>
+        <p:spPr>
+          <a:xfrm>
+            <a:off x="1592605" y="4276436"/>
+            <a:ext cx="2917135" cy="1863725"/>
+          </a:xfrm>
+          <a:prstGeom prst="rect">
+            <a:avLst/>
+          </a:prstGeom>
+        </p:spPr>
+      </p:pic>
+      <p:pic>
+        <p:nvPicPr>
+          <p:cNvPr id="9" name="Picture 8"/>
+          <p:cNvPicPr>
+            <a:picLocks noChangeAspect="1"/>
+          </p:cNvPicPr>
+          <p:nvPr/>
+        </p:nvPicPr>
+        <p:blipFill>
+          <a:blip r:embed="rId5">
+            <a:extLst>
+              <a:ext uri="{28A0092B-C50C-407E-A947-70E740481C1C}">
+                <a14:useLocalDpi xmlns:a14="http://schemas.microsoft.com/office/drawing/2010/main" val="0"/>
+              </a:ext>
+            </a:extLst>
+          </a:blip>
+          <a:stretch>
+            <a:fillRect/>
+          </a:stretch>
+        </p:blipFill>
+        <p:spPr>
+          <a:xfrm>
+            <a:off x="7479384" y="4982960"/>
+            <a:ext cx="3809524" cy="1380952"/>
+          </a:xfrm>
+          <a:prstGeom prst="rect">
+            <a:avLst/>
+          </a:prstGeom>
+        </p:spPr>
+      </p:pic>
+    </p:spTree>
+    <p:extLst>
+      <p:ext uri="{BB962C8B-B14F-4D97-AF65-F5344CB8AC3E}">
+        <p14:creationId xmlns:p14="http://schemas.microsoft.com/office/powerpoint/2010/main" val="754101316"/>
+      </p:ext>
+    </p:extLst>
+  </p:cSld>
+  <p:clrMapOvr>
+    <a:masterClrMapping/>
+  </p:clrMapOvr>
+  <p:timing>
+    <p:tnLst>
+      <p:par>
+        <p:cTn id="1" dur="indefinite" restart="never" nodeType="tmRoot"/>
+      </p:par>
+    </p:tnLst>
+  </p:timing>
+</p:sld>
+</file>
+
+<file path=ppt/slides/slide5.xml><?xml version="1.0" encoding="utf-8"?>
+<p:sld xmlns:a="http://schemas.openxmlformats.org/drawingml/2006/main" xmlns:r="http://schemas.openxmlformats.org/officeDocument/2006/relationships" xmlns:p="http://schemas.openxmlformats.org/presentationml/2006/main">
+  <p:cSld>
+    <p:spTree>
+      <p:nvGrpSpPr>
+        <p:cNvPr id="1" name=""/>
+        <p:cNvGrpSpPr/>
+        <p:nvPr/>
+      </p:nvGrpSpPr>
+      <p:grpSpPr>
+        <a:xfrm>
+          <a:off x="0" y="0"/>
+          <a:ext cx="0" cy="0"/>
+          <a:chOff x="0" y="0"/>
+          <a:chExt cx="0" cy="0"/>
+        </a:xfrm>
+      </p:grpSpPr>
+      <p:sp>
+        <p:nvSpPr>
+          <p:cNvPr id="2" name="Title 1"/>
+          <p:cNvSpPr>
+            <a:spLocks noGrp="1"/>
+          </p:cNvSpPr>
+          <p:nvPr>
+            <p:ph type="title"/>
+          </p:nvPr>
+        </p:nvSpPr>
+        <p:spPr/>
+        <p:txBody>
+          <a:bodyPr/>
+          <a:lstStyle/>
+          <a:p>
+            <a:r>
+              <a:rPr lang="en-US" dirty="0" smtClean="0"/>
+              <a:t>Read More</a:t>
+            </a:r>
+            <a:endParaRPr lang="en-US" dirty="0"/>
+          </a:p>
+        </p:txBody>
+      </p:sp>
+      <p:sp>
+        <p:nvSpPr>
+          <p:cNvPr id="3" name="Content Placeholder 2"/>
+          <p:cNvSpPr>
+            <a:spLocks noGrp="1"/>
+          </p:cNvSpPr>
+          <p:nvPr>
+            <p:ph idx="1"/>
+          </p:nvPr>
+        </p:nvSpPr>
+        <p:spPr/>
+        <p:txBody>
+          <a:bodyPr/>
+          <a:lstStyle/>
+          <a:p>
+            <a:r>
+              <a:rPr lang="en-US" dirty="0" smtClean="0"/>
+              <a:t>What’s new in </a:t>
+            </a:r>
+            <a:r>
+              <a:rPr lang="en-US" dirty="0"/>
+              <a:t>new bootstrap: </a:t>
+            </a:r>
+            <a:r>
+              <a:rPr lang="en-US" dirty="0">
+                <a:hlinkClick r:id="rId2"/>
+              </a:rPr>
+              <a:t>https://</a:t>
+            </a:r>
+            <a:r>
+              <a:rPr lang="en-US" dirty="0" smtClean="0">
+                <a:hlinkClick r:id="rId2"/>
+              </a:rPr>
+              <a:t>scotch.io/bar-talk/whats-new-in-bootstrap-4</a:t>
+            </a:r>
+            <a:endParaRPr lang="en-US" dirty="0" smtClean="0"/>
+          </a:p>
+          <a:p>
+            <a:r>
+              <a:rPr lang="en-US" dirty="0"/>
+              <a:t>Free </a:t>
+            </a:r>
+            <a:r>
+              <a:rPr lang="en-US" dirty="0" smtClean="0"/>
+              <a:t>themes for Bootstrap 3: </a:t>
+            </a:r>
+            <a:r>
+              <a:rPr lang="en-US" dirty="0">
+                <a:hlinkClick r:id="rId3"/>
+              </a:rPr>
+              <a:t>https://</a:t>
+            </a:r>
+            <a:r>
+              <a:rPr lang="en-US" dirty="0" smtClean="0">
+                <a:hlinkClick r:id="rId3"/>
+              </a:rPr>
+              <a:t>bootswatch.com</a:t>
+            </a:r>
+            <a:endParaRPr lang="en-US" dirty="0" smtClean="0"/>
+          </a:p>
+          <a:p>
+            <a:r>
+              <a:rPr lang="en-US" dirty="0" smtClean="0"/>
+              <a:t>Bootstrap components </a:t>
+            </a:r>
+            <a:r>
+              <a:rPr lang="en-US" dirty="0"/>
+              <a:t>for </a:t>
+            </a:r>
+            <a:r>
+              <a:rPr lang="en-US" dirty="0" smtClean="0"/>
+              <a:t>Angular 1: </a:t>
+            </a:r>
+            <a:r>
+              <a:rPr lang="en-US" dirty="0">
+                <a:hlinkClick r:id="rId4"/>
+              </a:rPr>
+              <a:t>https://</a:t>
+            </a:r>
+            <a:r>
+              <a:rPr lang="en-US" dirty="0" smtClean="0">
+                <a:hlinkClick r:id="rId4"/>
+              </a:rPr>
+              <a:t>angular-ui.github.io/bootstrap</a:t>
+            </a:r>
+            <a:endParaRPr lang="en-US" dirty="0" smtClean="0"/>
+          </a:p>
+          <a:p>
+            <a:endParaRPr lang="en-US" dirty="0"/>
+          </a:p>
+        </p:txBody>
+      </p:sp>
+    </p:spTree>
+    <p:extLst>
+      <p:ext uri="{BB962C8B-B14F-4D97-AF65-F5344CB8AC3E}">
+        <p14:creationId xmlns:p14="http://schemas.microsoft.com/office/powerpoint/2010/main" val="2535412055"/>
+      </p:ext>
+    </p:extLst>
+  </p:cSld>
+  <p:clrMapOvr>
+    <a:masterClrMapping/>
+  </p:clrMapOvr>
+</p:sld>
+</file>
+
+<file path=ppt/slides/slide6.xml><?xml version="1.0" encoding="utf-8"?>
+<p:sld xmlns:a="http://schemas.openxmlformats.org/drawingml/2006/main" xmlns:r="http://schemas.openxmlformats.org/officeDocument/2006/relationships" xmlns:p="http://schemas.openxmlformats.org/presentationml/2006/main">
+  <p:cSld>
+    <p:spTree>
+      <p:nvGrpSpPr>
+        <p:cNvPr id="1" name=""/>
+        <p:cNvGrpSpPr/>
+        <p:nvPr/>
+      </p:nvGrpSpPr>
+      <p:grpSpPr>
+        <a:xfrm>
+          <a:off x="0" y="0"/>
+          <a:ext cx="0" cy="0"/>
+          <a:chOff x="0" y="0"/>
+          <a:chExt cx="0" cy="0"/>
+        </a:xfrm>
+      </p:grpSpPr>
+      <p:sp>
+        <p:nvSpPr>
+          <p:cNvPr id="2" name="Title 1"/>
+          <p:cNvSpPr>
+            <a:spLocks noGrp="1"/>
+          </p:cNvSpPr>
+          <p:nvPr>
+            <p:ph type="title"/>
+          </p:nvPr>
+        </p:nvSpPr>
+        <p:spPr/>
+        <p:txBody>
+          <a:bodyPr/>
+          <a:lstStyle/>
+          <a:p>
+            <a:r>
+              <a:rPr lang="en-US" dirty="0" smtClean="0"/>
+              <a:t>Questions?</a:t>
+            </a:r>
+            <a:endParaRPr lang="en-US" dirty="0"/>
+          </a:p>
+        </p:txBody>
+      </p:sp>
+      <p:pic>
+        <p:nvPicPr>
+          <p:cNvPr id="4" name="Content Placeholder 3"/>
+          <p:cNvPicPr>
+            <a:picLocks noGrp="1" noChangeAspect="1"/>
+          </p:cNvPicPr>
+          <p:nvPr>
+            <p:ph idx="1"/>
+          </p:nvPr>
+        </p:nvPicPr>
+        <p:blipFill>
+          <a:blip r:embed="rId2">
+            <a:extLst>
+              <a:ext uri="{28A0092B-C50C-407E-A947-70E740481C1C}">
+                <a14:useLocalDpi xmlns:a14="http://schemas.microsoft.com/office/drawing/2010/main" val="0"/>
+              </a:ext>
+            </a:extLst>
+          </a:blip>
+          <a:stretch>
+            <a:fillRect/>
+          </a:stretch>
+        </p:blipFill>
+        <p:spPr>
+          <a:xfrm>
+            <a:off x="4683125" y="3112294"/>
+            <a:ext cx="1609725" cy="2047875"/>
+          </a:xfrm>
+        </p:spPr>
+      </p:pic>
+    </p:spTree>
+    <p:extLst>
+      <p:ext uri="{BB962C8B-B14F-4D97-AF65-F5344CB8AC3E}">
+        <p14:creationId xmlns:p14="http://schemas.microsoft.com/office/powerpoint/2010/main" val="479884378"/>
+      </p:ext>
+    </p:extLst>
+  </p:cSld>
+  <p:clrMapOvr>
+    <a:masterClrMapping/>
+  </p:clrMapOvr>
+</p:sld>
+</file>
+
+<file path=ppt/slides/slide7.xml><?xml version="1.0" encoding="utf-8"?>
+<p:sld xmlns:a="http://schemas.openxmlformats.org/drawingml/2006/main" xmlns:r="http://schemas.openxmlformats.org/officeDocument/2006/relationships" xmlns:p="http://schemas.openxmlformats.org/presentationml/2006/main">
+  <p:cSld>
+    <p:spTree>
+      <p:nvGrpSpPr>
+        <p:cNvPr id="1" name=""/>
+        <p:cNvGrpSpPr/>
+        <p:nvPr/>
+      </p:nvGrpSpPr>
+      <p:grpSpPr>
+        <a:xfrm>
+          <a:off x="0" y="0"/>
+          <a:ext cx="0" cy="0"/>
+          <a:chOff x="0" y="0"/>
+          <a:chExt cx="0" cy="0"/>
+        </a:xfrm>
+      </p:grpSpPr>
+      <p:sp>
+        <p:nvSpPr>
+          <p:cNvPr id="2" name="Title 1"/>
+          <p:cNvSpPr>
+            <a:spLocks noGrp="1"/>
+          </p:cNvSpPr>
+          <p:nvPr>
+            <p:ph type="title"/>
+          </p:nvPr>
+        </p:nvSpPr>
+        <p:spPr/>
+        <p:txBody>
+          <a:bodyPr/>
+          <a:lstStyle/>
+          <a:p>
+            <a:r>
+              <a:rPr lang="en-US" dirty="0" smtClean="0"/>
+              <a:t>Thank you!</a:t>
+            </a:r>
+            <a:endParaRPr lang="en-US" dirty="0"/>
+          </a:p>
+        </p:txBody>
+      </p:sp>
+      <p:pic>
+        <p:nvPicPr>
+          <p:cNvPr id="4" name="Content Placeholder 3"/>
+          <p:cNvPicPr>
+            <a:picLocks noGrp="1" noChangeAspect="1"/>
+          </p:cNvPicPr>
+          <p:nvPr>
+            <p:ph idx="1"/>
+          </p:nvPr>
+        </p:nvPicPr>
+        <p:blipFill>
+          <a:blip r:embed="rId2">
+            <a:extLst>
+              <a:ext uri="{28A0092B-C50C-407E-A947-70E740481C1C}">
+                <a14:useLocalDpi xmlns:a14="http://schemas.microsoft.com/office/drawing/2010/main" val="0"/>
+              </a:ext>
+            </a:extLst>
+          </a:blip>
+          <a:stretch>
+            <a:fillRect/>
+          </a:stretch>
+        </p:blipFill>
+        <p:spPr>
+          <a:xfrm>
+            <a:off x="3049588" y="2516981"/>
+            <a:ext cx="4876800" cy="3238500"/>
+          </a:xfrm>
+        </p:spPr>
+      </p:pic>
+    </p:spTree>
+    <p:extLst>
+      <p:ext uri="{BB962C8B-B14F-4D97-AF65-F5344CB8AC3E}">
+        <p14:creationId xmlns:p14="http://schemas.microsoft.com/office/powerpoint/2010/main" val="2845571920"/>
+      </p:ext>
+    </p:extLst>
+  </p:cSld>
+  <p:clrMapOvr>
+    <a:masterClrMapping/>
+  </p:clrMapOvr>
 </p:sld>
 </file>
 

</xml_diff>

<commit_message>
Added examples of layouts.
</commit_message>
<xml_diff>
--- a/bootstrap/Bootstrap.pptx
+++ b/bootstrap/Bootstrap.pptx
@@ -7,11 +7,13 @@
   <p:sldIdLst>
     <p:sldId id="256" r:id="rId2"/>
     <p:sldId id="257" r:id="rId3"/>
-    <p:sldId id="259" r:id="rId4"/>
-    <p:sldId id="258" r:id="rId5"/>
-    <p:sldId id="260" r:id="rId6"/>
-    <p:sldId id="261" r:id="rId7"/>
-    <p:sldId id="262" r:id="rId8"/>
+    <p:sldId id="263" r:id="rId4"/>
+    <p:sldId id="264" r:id="rId5"/>
+    <p:sldId id="259" r:id="rId6"/>
+    <p:sldId id="258" r:id="rId7"/>
+    <p:sldId id="260" r:id="rId8"/>
+    <p:sldId id="261" r:id="rId9"/>
+    <p:sldId id="262" r:id="rId10"/>
   </p:sldIdLst>
   <p:sldSz cx="12192000" cy="6858000"/>
   <p:notesSz cx="6858000" cy="9144000"/>
@@ -7874,7 +7876,15 @@
           <a:p>
             <a:r>
               <a:rPr lang="pl-PL" dirty="0" smtClean="0"/>
-              <a:t>Esy customization</a:t>
+              <a:t>E</a:t>
+            </a:r>
+            <a:r>
+              <a:rPr lang="en-US" dirty="0" smtClean="0"/>
+              <a:t>a</a:t>
+            </a:r>
+            <a:r>
+              <a:rPr lang="pl-PL" dirty="0" smtClean="0"/>
+              <a:t>sy customization</a:t>
             </a:r>
             <a:endParaRPr lang="en-US" dirty="0" smtClean="0"/>
           </a:p>
@@ -7937,7 +7947,7 @@
           <a:p>
             <a:r>
               <a:rPr lang="en-US" dirty="0" smtClean="0"/>
-              <a:t>Bootstrap 4</a:t>
+              <a:t>Layout utilities</a:t>
             </a:r>
             <a:endParaRPr lang="en-US" dirty="0"/>
           </a:p>
@@ -7960,6 +7970,507 @@
           </a:bodyPr>
           <a:lstStyle/>
           <a:p>
+            <a:pPr marL="0" indent="0">
+              <a:buNone/>
+            </a:pPr>
+            <a:r>
+              <a:rPr lang="en-US" dirty="0" smtClean="0"/>
+              <a:t>Containers:</a:t>
+            </a:r>
+          </a:p>
+          <a:p>
+            <a:pPr marL="0" indent="0">
+              <a:buNone/>
+            </a:pPr>
+            <a:r>
+              <a:rPr lang="en-US" dirty="0" smtClean="0"/>
+              <a:t> - </a:t>
+            </a:r>
+            <a:r>
+              <a:rPr lang="en-US" dirty="0" smtClean="0">
+                <a:solidFill>
+                  <a:schemeClr val="bg1">
+                    <a:lumMod val="75000"/>
+                    <a:lumOff val="25000"/>
+                  </a:schemeClr>
+                </a:solidFill>
+              </a:rPr>
+              <a:t>.container</a:t>
+            </a:r>
+          </a:p>
+          <a:p>
+            <a:pPr marL="0" indent="0">
+              <a:buNone/>
+            </a:pPr>
+            <a:r>
+              <a:rPr lang="en-US" dirty="0"/>
+              <a:t> </a:t>
+            </a:r>
+            <a:r>
+              <a:rPr lang="en-US" dirty="0" smtClean="0"/>
+              <a:t>- </a:t>
+            </a:r>
+            <a:r>
+              <a:rPr lang="en-US" dirty="0" smtClean="0">
+                <a:solidFill>
+                  <a:schemeClr val="bg1">
+                    <a:lumMod val="75000"/>
+                    <a:lumOff val="25000"/>
+                  </a:schemeClr>
+                </a:solidFill>
+              </a:rPr>
+              <a:t>.container-fluid</a:t>
+            </a:r>
+          </a:p>
+          <a:p>
+            <a:pPr marL="0" indent="0">
+              <a:buNone/>
+            </a:pPr>
+            <a:r>
+              <a:rPr lang="en-US" dirty="0" smtClean="0"/>
+              <a:t>Grid:</a:t>
+            </a:r>
+          </a:p>
+          <a:p>
+            <a:pPr marL="0" indent="0">
+              <a:buNone/>
+            </a:pPr>
+            <a:r>
+              <a:rPr lang="en-US" dirty="0"/>
+              <a:t> </a:t>
+            </a:r>
+            <a:r>
+              <a:rPr lang="en-US" dirty="0" smtClean="0"/>
+              <a:t>- </a:t>
+            </a:r>
+            <a:r>
+              <a:rPr lang="en-US" dirty="0" smtClean="0">
+                <a:solidFill>
+                  <a:schemeClr val="bg1">
+                    <a:lumMod val="75000"/>
+                    <a:lumOff val="25000"/>
+                  </a:schemeClr>
+                </a:solidFill>
+              </a:rPr>
+              <a:t>.row</a:t>
+            </a:r>
+          </a:p>
+          <a:p>
+            <a:pPr marL="0" indent="0">
+              <a:buNone/>
+            </a:pPr>
+            <a:r>
+              <a:rPr lang="en-US" dirty="0" smtClean="0"/>
+              <a:t> - columns: </a:t>
+            </a:r>
+            <a:r>
+              <a:rPr lang="en-US" dirty="0" smtClean="0">
+                <a:solidFill>
+                  <a:schemeClr val="bg1">
+                    <a:lumMod val="75000"/>
+                    <a:lumOff val="25000"/>
+                  </a:schemeClr>
+                </a:solidFill>
+              </a:rPr>
+              <a:t>.col-xs-1</a:t>
+            </a:r>
+            <a:r>
+              <a:rPr lang="en-US" dirty="0" smtClean="0"/>
+              <a:t>, </a:t>
+            </a:r>
+            <a:r>
+              <a:rPr lang="en-US" dirty="0" smtClean="0">
+                <a:solidFill>
+                  <a:schemeClr val="bg1">
+                    <a:lumMod val="75000"/>
+                    <a:lumOff val="25000"/>
+                  </a:schemeClr>
+                </a:solidFill>
+              </a:rPr>
+              <a:t>.col-md-2</a:t>
+            </a:r>
+          </a:p>
+          <a:p>
+            <a:pPr marL="0" indent="0">
+              <a:buNone/>
+            </a:pPr>
+            <a:r>
+              <a:rPr lang="en-US" dirty="0" smtClean="0"/>
+              <a:t> - offsets: </a:t>
+            </a:r>
+            <a:r>
+              <a:rPr lang="en-US" dirty="0" smtClean="0">
+                <a:solidFill>
+                  <a:schemeClr val="bg1">
+                    <a:lumMod val="75000"/>
+                    <a:lumOff val="25000"/>
+                  </a:schemeClr>
+                </a:solidFill>
+              </a:rPr>
+              <a:t>.col-xs-offset-1</a:t>
+            </a:r>
+            <a:r>
+              <a:rPr lang="en-US" dirty="0" smtClean="0"/>
+              <a:t>, </a:t>
+            </a:r>
+            <a:r>
+              <a:rPr lang="en-US" dirty="0">
+                <a:solidFill>
+                  <a:schemeClr val="bg1">
+                    <a:lumMod val="75000"/>
+                    <a:lumOff val="25000"/>
+                  </a:schemeClr>
+                </a:solidFill>
+              </a:rPr>
+              <a:t>.</a:t>
+            </a:r>
+            <a:r>
+              <a:rPr lang="en-US" dirty="0" smtClean="0">
+                <a:solidFill>
+                  <a:schemeClr val="bg1">
+                    <a:lumMod val="75000"/>
+                    <a:lumOff val="25000"/>
+                  </a:schemeClr>
+                </a:solidFill>
+              </a:rPr>
+              <a:t>col-md-offset-2</a:t>
+            </a:r>
+          </a:p>
+          <a:p>
+            <a:pPr marL="0" indent="0">
+              <a:buNone/>
+            </a:pPr>
+            <a:r>
+              <a:rPr lang="en-US" dirty="0"/>
+              <a:t> </a:t>
+            </a:r>
+            <a:r>
+              <a:rPr lang="en-US" dirty="0" smtClean="0"/>
+              <a:t>- positioning: </a:t>
+            </a:r>
+            <a:r>
+              <a:rPr lang="en-US" dirty="0" smtClean="0">
+                <a:solidFill>
+                  <a:schemeClr val="bg1">
+                    <a:lumMod val="75000"/>
+                    <a:lumOff val="25000"/>
+                  </a:schemeClr>
+                </a:solidFill>
+              </a:rPr>
+              <a:t>.col-xs-pull-1</a:t>
+            </a:r>
+            <a:r>
+              <a:rPr lang="en-US" dirty="0" smtClean="0"/>
+              <a:t>, </a:t>
+            </a:r>
+            <a:r>
+              <a:rPr lang="en-US" dirty="0" smtClean="0">
+                <a:solidFill>
+                  <a:schemeClr val="bg1">
+                    <a:lumMod val="75000"/>
+                    <a:lumOff val="25000"/>
+                  </a:schemeClr>
+                </a:solidFill>
+              </a:rPr>
+              <a:t>.col-md-push-8</a:t>
+            </a:r>
+          </a:p>
+          <a:p>
+            <a:pPr marL="0" indent="0">
+              <a:buNone/>
+            </a:pPr>
+            <a:r>
+              <a:rPr lang="en-US" dirty="0"/>
+              <a:t> </a:t>
+            </a:r>
+            <a:r>
+              <a:rPr lang="en-US" dirty="0" smtClean="0"/>
+              <a:t>- visibility: </a:t>
+            </a:r>
+            <a:r>
+              <a:rPr lang="en-US" dirty="0" smtClean="0">
+                <a:solidFill>
+                  <a:schemeClr val="bg1">
+                    <a:lumMod val="75000"/>
+                    <a:lumOff val="25000"/>
+                  </a:schemeClr>
+                </a:solidFill>
+              </a:rPr>
+              <a:t>.visible-</a:t>
+            </a:r>
+            <a:r>
+              <a:rPr lang="en-US" dirty="0" err="1" smtClean="0">
+                <a:solidFill>
+                  <a:schemeClr val="bg1">
+                    <a:lumMod val="75000"/>
+                    <a:lumOff val="25000"/>
+                  </a:schemeClr>
+                </a:solidFill>
+              </a:rPr>
+              <a:t>xs</a:t>
+            </a:r>
+            <a:r>
+              <a:rPr lang="en-US" dirty="0" smtClean="0">
+                <a:solidFill>
+                  <a:schemeClr val="bg1">
+                    <a:lumMod val="75000"/>
+                    <a:lumOff val="25000"/>
+                  </a:schemeClr>
+                </a:solidFill>
+              </a:rPr>
+              <a:t>-inline</a:t>
+            </a:r>
+            <a:r>
+              <a:rPr lang="en-US" dirty="0" smtClean="0"/>
+              <a:t>, </a:t>
+            </a:r>
+            <a:r>
+              <a:rPr lang="en-US" dirty="0" smtClean="0">
+                <a:solidFill>
+                  <a:schemeClr val="bg1">
+                    <a:lumMod val="75000"/>
+                    <a:lumOff val="25000"/>
+                  </a:schemeClr>
+                </a:solidFill>
+              </a:rPr>
+              <a:t>.hidden-md </a:t>
+            </a:r>
+            <a:endParaRPr lang="en-US" dirty="0">
+              <a:solidFill>
+                <a:schemeClr val="bg1">
+                  <a:lumMod val="75000"/>
+                  <a:lumOff val="25000"/>
+                </a:schemeClr>
+              </a:solidFill>
+            </a:endParaRPr>
+          </a:p>
+        </p:txBody>
+      </p:sp>
+    </p:spTree>
+    <p:extLst>
+      <p:ext uri="{BB962C8B-B14F-4D97-AF65-F5344CB8AC3E}">
+        <p14:creationId xmlns:p14="http://schemas.microsoft.com/office/powerpoint/2010/main" val="2421464713"/>
+      </p:ext>
+    </p:extLst>
+  </p:cSld>
+  <p:clrMapOvr>
+    <a:masterClrMapping/>
+  </p:clrMapOvr>
+</p:sld>
+</file>
+
+<file path=ppt/slides/slide4.xml><?xml version="1.0" encoding="utf-8"?>
+<p:sld xmlns:a="http://schemas.openxmlformats.org/drawingml/2006/main" xmlns:r="http://schemas.openxmlformats.org/officeDocument/2006/relationships" xmlns:p="http://schemas.openxmlformats.org/presentationml/2006/main">
+  <p:cSld>
+    <p:spTree>
+      <p:nvGrpSpPr>
+        <p:cNvPr id="1" name=""/>
+        <p:cNvGrpSpPr/>
+        <p:nvPr/>
+      </p:nvGrpSpPr>
+      <p:grpSpPr>
+        <a:xfrm>
+          <a:off x="0" y="0"/>
+          <a:ext cx="0" cy="0"/>
+          <a:chOff x="0" y="0"/>
+          <a:chExt cx="0" cy="0"/>
+        </a:xfrm>
+      </p:grpSpPr>
+      <p:sp>
+        <p:nvSpPr>
+          <p:cNvPr id="2" name="Title 1"/>
+          <p:cNvSpPr>
+            <a:spLocks noGrp="1"/>
+          </p:cNvSpPr>
+          <p:nvPr>
+            <p:ph type="title"/>
+          </p:nvPr>
+        </p:nvSpPr>
+        <p:spPr/>
+        <p:txBody>
+          <a:bodyPr/>
+          <a:lstStyle/>
+          <a:p>
+            <a:r>
+              <a:rPr lang="en-US" smtClean="0"/>
+              <a:t>Sass utilities</a:t>
+            </a:r>
+            <a:endParaRPr lang="en-US" dirty="0"/>
+          </a:p>
+        </p:txBody>
+      </p:sp>
+      <p:sp>
+        <p:nvSpPr>
+          <p:cNvPr id="3" name="Content Placeholder 2"/>
+          <p:cNvSpPr>
+            <a:spLocks noGrp="1"/>
+          </p:cNvSpPr>
+          <p:nvPr>
+            <p:ph idx="1"/>
+          </p:nvPr>
+        </p:nvSpPr>
+        <p:spPr/>
+        <p:txBody>
+          <a:bodyPr/>
+          <a:lstStyle/>
+          <a:p>
+            <a:pPr marL="0" indent="0">
+              <a:buNone/>
+            </a:pPr>
+            <a:r>
+              <a:rPr lang="en-US" dirty="0" smtClean="0"/>
+              <a:t> - </a:t>
+            </a:r>
+            <a:r>
+              <a:rPr lang="en-US" dirty="0" err="1" smtClean="0"/>
+              <a:t>clearfix</a:t>
+            </a:r>
+            <a:endParaRPr lang="en-US" dirty="0" smtClean="0"/>
+          </a:p>
+          <a:p>
+            <a:pPr marL="0" indent="0">
+              <a:buNone/>
+            </a:pPr>
+            <a:r>
+              <a:rPr lang="en-US" dirty="0"/>
+              <a:t> </a:t>
+            </a:r>
+            <a:r>
+              <a:rPr lang="en-US" dirty="0" smtClean="0"/>
+              <a:t>- grid </a:t>
+            </a:r>
+            <a:r>
+              <a:rPr lang="en-US" dirty="0" err="1" smtClean="0"/>
+              <a:t>mixins</a:t>
+            </a:r>
+            <a:endParaRPr lang="en-US" dirty="0" smtClean="0"/>
+          </a:p>
+          <a:p>
+            <a:pPr marL="0" indent="0">
+              <a:buNone/>
+            </a:pPr>
+            <a:r>
+              <a:rPr lang="en-US" dirty="0"/>
+              <a:t> </a:t>
+            </a:r>
+            <a:r>
+              <a:rPr lang="en-US" dirty="0" smtClean="0"/>
+              <a:t>- responsive images</a:t>
+            </a:r>
+          </a:p>
+          <a:p>
+            <a:pPr marL="0" indent="0">
+              <a:buNone/>
+            </a:pPr>
+            <a:r>
+              <a:rPr lang="en-US" dirty="0"/>
+              <a:t> </a:t>
+            </a:r>
+            <a:r>
+              <a:rPr lang="en-US" dirty="0" smtClean="0"/>
+              <a:t>- size</a:t>
+            </a:r>
+          </a:p>
+          <a:p>
+            <a:pPr marL="0" indent="0">
+              <a:buNone/>
+            </a:pPr>
+            <a:r>
+              <a:rPr lang="en-US" dirty="0"/>
+              <a:t> </a:t>
+            </a:r>
+            <a:r>
+              <a:rPr lang="en-US" dirty="0" smtClean="0"/>
+              <a:t>- reset-text</a:t>
+            </a:r>
+          </a:p>
+          <a:p>
+            <a:pPr marL="0" indent="0">
+              <a:buNone/>
+            </a:pPr>
+            <a:r>
+              <a:rPr lang="en-US" dirty="0" smtClean="0"/>
+              <a:t> - text overflow</a:t>
+            </a:r>
+          </a:p>
+          <a:p>
+            <a:pPr marL="0" indent="0">
+              <a:buNone/>
+            </a:pPr>
+            <a:endParaRPr lang="en-US" dirty="0"/>
+          </a:p>
+        </p:txBody>
+      </p:sp>
+    </p:spTree>
+    <p:extLst>
+      <p:ext uri="{BB962C8B-B14F-4D97-AF65-F5344CB8AC3E}">
+        <p14:creationId xmlns:p14="http://schemas.microsoft.com/office/powerpoint/2010/main" val="2730102515"/>
+      </p:ext>
+    </p:extLst>
+  </p:cSld>
+  <p:clrMapOvr>
+    <a:masterClrMapping/>
+  </p:clrMapOvr>
+</p:sld>
+</file>
+
+<file path=ppt/slides/slide5.xml><?xml version="1.0" encoding="utf-8"?>
+<p:sld xmlns:a="http://schemas.openxmlformats.org/drawingml/2006/main" xmlns:r="http://schemas.openxmlformats.org/officeDocument/2006/relationships" xmlns:p="http://schemas.openxmlformats.org/presentationml/2006/main">
+  <p:cSld>
+    <p:spTree>
+      <p:nvGrpSpPr>
+        <p:cNvPr id="1" name=""/>
+        <p:cNvGrpSpPr/>
+        <p:nvPr/>
+      </p:nvGrpSpPr>
+      <p:grpSpPr>
+        <a:xfrm>
+          <a:off x="0" y="0"/>
+          <a:ext cx="0" cy="0"/>
+          <a:chOff x="0" y="0"/>
+          <a:chExt cx="0" cy="0"/>
+        </a:xfrm>
+      </p:grpSpPr>
+      <p:sp>
+        <p:nvSpPr>
+          <p:cNvPr id="2" name="Title 1"/>
+          <p:cNvSpPr>
+            <a:spLocks noGrp="1"/>
+          </p:cNvSpPr>
+          <p:nvPr>
+            <p:ph type="title"/>
+          </p:nvPr>
+        </p:nvSpPr>
+        <p:spPr/>
+        <p:txBody>
+          <a:bodyPr/>
+          <a:lstStyle/>
+          <a:p>
+            <a:r>
+              <a:rPr lang="en-US" dirty="0" smtClean="0"/>
+              <a:t>Bootstrap 4</a:t>
+            </a:r>
+            <a:endParaRPr lang="en-US" dirty="0"/>
+          </a:p>
+        </p:txBody>
+      </p:sp>
+      <p:sp>
+        <p:nvSpPr>
+          <p:cNvPr id="3" name="Content Placeholder 2"/>
+          <p:cNvSpPr>
+            <a:spLocks noGrp="1"/>
+          </p:cNvSpPr>
+          <p:nvPr>
+            <p:ph idx="1"/>
+          </p:nvPr>
+        </p:nvSpPr>
+        <p:spPr/>
+        <p:txBody>
+          <a:bodyPr>
+            <a:normAutofit fontScale="92500" lnSpcReduction="20000"/>
+          </a:bodyPr>
+          <a:lstStyle/>
+          <a:p>
             <a:r>
               <a:rPr lang="en-US" dirty="0" smtClean="0"/>
               <a:t>Made with SASS</a:t>
@@ -7968,18 +8479,29 @@
           <a:p>
             <a:r>
               <a:rPr lang="en-US" dirty="0" smtClean="0"/>
-              <a:t>Has grid system based on “</a:t>
+              <a:t>Uses “</a:t>
+            </a:r>
+            <a:r>
+              <a:rPr lang="en-US" dirty="0" err="1" smtClean="0"/>
+              <a:t>em”s</a:t>
+            </a:r>
+            <a:r>
+              <a:rPr lang="en-US" dirty="0" smtClean="0"/>
+              <a:t> and “</a:t>
             </a:r>
             <a:r>
               <a:rPr lang="en-US" dirty="0" err="1" smtClean="0"/>
               <a:t>rem”s</a:t>
             </a:r>
-            <a:endParaRPr lang="en-US" dirty="0" smtClean="0"/>
-          </a:p>
-          <a:p>
             <a:r>
               <a:rPr lang="en-US" dirty="0" smtClean="0"/>
-              <a:t>Grid system can use Flex Box optionally</a:t>
+              <a:t> units for sizing</a:t>
+            </a:r>
+          </a:p>
+          <a:p>
+            <a:r>
+              <a:rPr lang="en-US" dirty="0" smtClean="0"/>
+              <a:t>Grid system uses Flex Box</a:t>
             </a:r>
           </a:p>
           <a:p>
@@ -8015,7 +8537,13 @@
           <a:p>
             <a:r>
               <a:rPr lang="en-US" dirty="0" smtClean="0"/>
-              <a:t>Tether library added as a dependency for Tooltips and Popovers</a:t>
+              <a:t>Popper.js library added as a dependency for Tooltips and Popovers</a:t>
+            </a:r>
+          </a:p>
+          <a:p>
+            <a:r>
+              <a:rPr lang="en-US" dirty="0" smtClean="0"/>
+              <a:t>New palette</a:t>
             </a:r>
           </a:p>
           <a:p>
@@ -8046,7 +8574,7 @@
 </p:sld>
 </file>
 
-<file path=ppt/slides/slide4.xml><?xml version="1.0" encoding="utf-8"?>
+<file path=ppt/slides/slide6.xml><?xml version="1.0" encoding="utf-8"?>
 <p:sld xmlns:a="http://schemas.openxmlformats.org/drawingml/2006/main" xmlns:r="http://schemas.openxmlformats.org/officeDocument/2006/relationships" xmlns:p="http://schemas.openxmlformats.org/presentationml/2006/main">
   <p:cSld>
     <p:spTree>
@@ -8225,233 +8753,6 @@
 </p:sld>
 </file>
 
-<file path=ppt/slides/slide5.xml><?xml version="1.0" encoding="utf-8"?>
-<p:sld xmlns:a="http://schemas.openxmlformats.org/drawingml/2006/main" xmlns:r="http://schemas.openxmlformats.org/officeDocument/2006/relationships" xmlns:p="http://schemas.openxmlformats.org/presentationml/2006/main">
-  <p:cSld>
-    <p:spTree>
-      <p:nvGrpSpPr>
-        <p:cNvPr id="1" name=""/>
-        <p:cNvGrpSpPr/>
-        <p:nvPr/>
-      </p:nvGrpSpPr>
-      <p:grpSpPr>
-        <a:xfrm>
-          <a:off x="0" y="0"/>
-          <a:ext cx="0" cy="0"/>
-          <a:chOff x="0" y="0"/>
-          <a:chExt cx="0" cy="0"/>
-        </a:xfrm>
-      </p:grpSpPr>
-      <p:sp>
-        <p:nvSpPr>
-          <p:cNvPr id="2" name="Title 1"/>
-          <p:cNvSpPr>
-            <a:spLocks noGrp="1"/>
-          </p:cNvSpPr>
-          <p:nvPr>
-            <p:ph type="title"/>
-          </p:nvPr>
-        </p:nvSpPr>
-        <p:spPr/>
-        <p:txBody>
-          <a:bodyPr/>
-          <a:lstStyle/>
-          <a:p>
-            <a:r>
-              <a:rPr lang="en-US" dirty="0" smtClean="0"/>
-              <a:t>Read More</a:t>
-            </a:r>
-            <a:endParaRPr lang="en-US" dirty="0"/>
-          </a:p>
-        </p:txBody>
-      </p:sp>
-      <p:sp>
-        <p:nvSpPr>
-          <p:cNvPr id="3" name="Content Placeholder 2"/>
-          <p:cNvSpPr>
-            <a:spLocks noGrp="1"/>
-          </p:cNvSpPr>
-          <p:nvPr>
-            <p:ph idx="1"/>
-          </p:nvPr>
-        </p:nvSpPr>
-        <p:spPr/>
-        <p:txBody>
-          <a:bodyPr/>
-          <a:lstStyle/>
-          <a:p>
-            <a:r>
-              <a:rPr lang="en-US" dirty="0" smtClean="0"/>
-              <a:t>What’s new in </a:t>
-            </a:r>
-            <a:r>
-              <a:rPr lang="en-US" dirty="0"/>
-              <a:t>new bootstrap: </a:t>
-            </a:r>
-            <a:r>
-              <a:rPr lang="en-US" dirty="0">
-                <a:hlinkClick r:id="rId2"/>
-              </a:rPr>
-              <a:t>https://</a:t>
-            </a:r>
-            <a:r>
-              <a:rPr lang="en-US" dirty="0" smtClean="0">
-                <a:hlinkClick r:id="rId2"/>
-              </a:rPr>
-              <a:t>scotch.io/bar-talk/whats-new-in-bootstrap-4</a:t>
-            </a:r>
-            <a:endParaRPr lang="en-US" dirty="0" smtClean="0"/>
-          </a:p>
-          <a:p>
-            <a:r>
-              <a:rPr lang="en-US" dirty="0"/>
-              <a:t>Free </a:t>
-            </a:r>
-            <a:r>
-              <a:rPr lang="en-US" dirty="0" smtClean="0"/>
-              <a:t>themes for Bootstrap 3: </a:t>
-            </a:r>
-            <a:r>
-              <a:rPr lang="en-US" dirty="0">
-                <a:hlinkClick r:id="rId3"/>
-              </a:rPr>
-              <a:t>https://</a:t>
-            </a:r>
-            <a:r>
-              <a:rPr lang="en-US" dirty="0" smtClean="0">
-                <a:hlinkClick r:id="rId3"/>
-              </a:rPr>
-              <a:t>bootswatch.com</a:t>
-            </a:r>
-            <a:endParaRPr lang="en-US" dirty="0" smtClean="0"/>
-          </a:p>
-          <a:p>
-            <a:r>
-              <a:rPr lang="en-US" dirty="0" smtClean="0"/>
-              <a:t>Bootstrap components </a:t>
-            </a:r>
-            <a:r>
-              <a:rPr lang="en-US" dirty="0"/>
-              <a:t>for </a:t>
-            </a:r>
-            <a:r>
-              <a:rPr lang="en-US" dirty="0" smtClean="0"/>
-              <a:t>Angular 1: </a:t>
-            </a:r>
-            <a:r>
-              <a:rPr lang="en-US" dirty="0">
-                <a:hlinkClick r:id="rId4"/>
-              </a:rPr>
-              <a:t>https://</a:t>
-            </a:r>
-            <a:r>
-              <a:rPr lang="en-US" dirty="0" smtClean="0">
-                <a:hlinkClick r:id="rId4"/>
-              </a:rPr>
-              <a:t>angular-ui.github.io/bootstrap</a:t>
-            </a:r>
-            <a:endParaRPr lang="en-US" dirty="0" smtClean="0"/>
-          </a:p>
-          <a:p>
-            <a:endParaRPr lang="en-US" dirty="0"/>
-          </a:p>
-        </p:txBody>
-      </p:sp>
-    </p:spTree>
-    <p:extLst>
-      <p:ext uri="{BB962C8B-B14F-4D97-AF65-F5344CB8AC3E}">
-        <p14:creationId xmlns:p14="http://schemas.microsoft.com/office/powerpoint/2010/main" val="2535412055"/>
-      </p:ext>
-    </p:extLst>
-  </p:cSld>
-  <p:clrMapOvr>
-    <a:masterClrMapping/>
-  </p:clrMapOvr>
-</p:sld>
-</file>
-
-<file path=ppt/slides/slide6.xml><?xml version="1.0" encoding="utf-8"?>
-<p:sld xmlns:a="http://schemas.openxmlformats.org/drawingml/2006/main" xmlns:r="http://schemas.openxmlformats.org/officeDocument/2006/relationships" xmlns:p="http://schemas.openxmlformats.org/presentationml/2006/main">
-  <p:cSld>
-    <p:spTree>
-      <p:nvGrpSpPr>
-        <p:cNvPr id="1" name=""/>
-        <p:cNvGrpSpPr/>
-        <p:nvPr/>
-      </p:nvGrpSpPr>
-      <p:grpSpPr>
-        <a:xfrm>
-          <a:off x="0" y="0"/>
-          <a:ext cx="0" cy="0"/>
-          <a:chOff x="0" y="0"/>
-          <a:chExt cx="0" cy="0"/>
-        </a:xfrm>
-      </p:grpSpPr>
-      <p:sp>
-        <p:nvSpPr>
-          <p:cNvPr id="2" name="Title 1"/>
-          <p:cNvSpPr>
-            <a:spLocks noGrp="1"/>
-          </p:cNvSpPr>
-          <p:nvPr>
-            <p:ph type="title"/>
-          </p:nvPr>
-        </p:nvSpPr>
-        <p:spPr/>
-        <p:txBody>
-          <a:bodyPr/>
-          <a:lstStyle/>
-          <a:p>
-            <a:r>
-              <a:rPr lang="en-US" dirty="0" smtClean="0"/>
-              <a:t>Questions?</a:t>
-            </a:r>
-            <a:endParaRPr lang="en-US" dirty="0"/>
-          </a:p>
-        </p:txBody>
-      </p:sp>
-      <p:pic>
-        <p:nvPicPr>
-          <p:cNvPr id="4" name="Content Placeholder 3"/>
-          <p:cNvPicPr>
-            <a:picLocks noGrp="1" noChangeAspect="1"/>
-          </p:cNvPicPr>
-          <p:nvPr>
-            <p:ph idx="1"/>
-          </p:nvPr>
-        </p:nvPicPr>
-        <p:blipFill>
-          <a:blip r:embed="rId2">
-            <a:extLst>
-              <a:ext uri="{28A0092B-C50C-407E-A947-70E740481C1C}">
-                <a14:useLocalDpi xmlns:a14="http://schemas.microsoft.com/office/drawing/2010/main" val="0"/>
-              </a:ext>
-            </a:extLst>
-          </a:blip>
-          <a:stretch>
-            <a:fillRect/>
-          </a:stretch>
-        </p:blipFill>
-        <p:spPr>
-          <a:xfrm>
-            <a:off x="4683125" y="3112294"/>
-            <a:ext cx="1609725" cy="2047875"/>
-          </a:xfrm>
-        </p:spPr>
-      </p:pic>
-    </p:spTree>
-    <p:extLst>
-      <p:ext uri="{BB962C8B-B14F-4D97-AF65-F5344CB8AC3E}">
-        <p14:creationId xmlns:p14="http://schemas.microsoft.com/office/powerpoint/2010/main" val="479884378"/>
-      </p:ext>
-    </p:extLst>
-  </p:cSld>
-  <p:clrMapOvr>
-    <a:masterClrMapping/>
-  </p:clrMapOvr>
-</p:sld>
-</file>
-
 <file path=ppt/slides/slide7.xml><?xml version="1.0" encoding="utf-8"?>
 <p:sld xmlns:a="http://schemas.openxmlformats.org/drawingml/2006/main" xmlns:r="http://schemas.openxmlformats.org/officeDocument/2006/relationships" xmlns:p="http://schemas.openxmlformats.org/presentationml/2006/main">
   <p:cSld>
@@ -8486,7 +8787,171 @@
           <a:p>
             <a:r>
               <a:rPr lang="en-US" dirty="0" smtClean="0"/>
-              <a:t>Thank you!</a:t>
+              <a:t>Read More</a:t>
+            </a:r>
+            <a:endParaRPr lang="en-US" dirty="0"/>
+          </a:p>
+        </p:txBody>
+      </p:sp>
+      <p:sp>
+        <p:nvSpPr>
+          <p:cNvPr id="3" name="Content Placeholder 2"/>
+          <p:cNvSpPr>
+            <a:spLocks noGrp="1"/>
+          </p:cNvSpPr>
+          <p:nvPr>
+            <p:ph idx="1"/>
+          </p:nvPr>
+        </p:nvSpPr>
+        <p:spPr/>
+        <p:txBody>
+          <a:bodyPr/>
+          <a:lstStyle/>
+          <a:p>
+            <a:r>
+              <a:rPr lang="en-US" dirty="0" smtClean="0"/>
+              <a:t>What’s new in </a:t>
+            </a:r>
+            <a:r>
+              <a:rPr lang="en-US" dirty="0"/>
+              <a:t>new bootstrap: </a:t>
+            </a:r>
+            <a:r>
+              <a:rPr lang="en-US" dirty="0">
+                <a:hlinkClick r:id="rId2"/>
+              </a:rPr>
+              <a:t>https://</a:t>
+            </a:r>
+            <a:r>
+              <a:rPr lang="en-US" dirty="0" smtClean="0">
+                <a:hlinkClick r:id="rId2"/>
+              </a:rPr>
+              <a:t>blog.templatetoaster.com/bootstrap-4</a:t>
+            </a:r>
+            <a:endParaRPr lang="en-US" dirty="0" smtClean="0"/>
+          </a:p>
+          <a:p>
+            <a:r>
+              <a:rPr lang="en-US" dirty="0" smtClean="0"/>
+              <a:t>Free themes for Bootstrap 3: </a:t>
+            </a:r>
+            <a:r>
+              <a:rPr lang="en-US" dirty="0" smtClean="0">
+                <a:hlinkClick r:id="rId3"/>
+              </a:rPr>
+              <a:t>https://bootswatch.com</a:t>
+            </a:r>
+            <a:endParaRPr lang="en-US" dirty="0" smtClean="0"/>
+          </a:p>
+          <a:p>
+            <a:r>
+              <a:rPr lang="en-US" dirty="0" smtClean="0"/>
+              <a:t>Bootstrap components </a:t>
+            </a:r>
+            <a:r>
+              <a:rPr lang="en-US" dirty="0"/>
+              <a:t>for </a:t>
+            </a:r>
+            <a:r>
+              <a:rPr lang="en-US" dirty="0" smtClean="0"/>
+              <a:t>Angular 1: </a:t>
+            </a:r>
+            <a:r>
+              <a:rPr lang="en-US" dirty="0">
+                <a:hlinkClick r:id="rId4"/>
+              </a:rPr>
+              <a:t>https://</a:t>
+            </a:r>
+            <a:r>
+              <a:rPr lang="en-US" dirty="0" smtClean="0">
+                <a:hlinkClick r:id="rId4"/>
+              </a:rPr>
+              <a:t>angular-ui.github.io/bootstrap</a:t>
+            </a:r>
+            <a:endParaRPr lang="pl-PL" dirty="0" smtClean="0"/>
+          </a:p>
+          <a:p>
+            <a:r>
+              <a:rPr lang="pl-PL" dirty="0"/>
+              <a:t>Guide to Flex Box: </a:t>
+            </a:r>
+            <a:r>
+              <a:rPr lang="pl-PL" dirty="0">
+                <a:hlinkClick r:id="rId5"/>
+              </a:rPr>
+              <a:t>https://</a:t>
+            </a:r>
+            <a:r>
+              <a:rPr lang="pl-PL" dirty="0" smtClean="0">
+                <a:hlinkClick r:id="rId5"/>
+              </a:rPr>
+              <a:t>css-tricks.com/snippets/css/a-guide-to-flexbox</a:t>
+            </a:r>
+            <a:endParaRPr lang="pl-PL" dirty="0" smtClean="0"/>
+          </a:p>
+          <a:p>
+            <a:endParaRPr lang="en-US" dirty="0" smtClean="0"/>
+          </a:p>
+          <a:p>
+            <a:endParaRPr lang="en-US" dirty="0"/>
+          </a:p>
+        </p:txBody>
+      </p:sp>
+    </p:spTree>
+    <p:extLst>
+      <p:ext uri="{BB962C8B-B14F-4D97-AF65-F5344CB8AC3E}">
+        <p14:creationId xmlns:p14="http://schemas.microsoft.com/office/powerpoint/2010/main" val="2535412055"/>
+      </p:ext>
+    </p:extLst>
+  </p:cSld>
+  <p:clrMapOvr>
+    <a:masterClrMapping/>
+  </p:clrMapOvr>
+  <p:timing>
+    <p:tnLst>
+      <p:par>
+        <p:cTn id="1" dur="indefinite" restart="never" nodeType="tmRoot"/>
+      </p:par>
+    </p:tnLst>
+  </p:timing>
+</p:sld>
+</file>
+
+<file path=ppt/slides/slide8.xml><?xml version="1.0" encoding="utf-8"?>
+<p:sld xmlns:a="http://schemas.openxmlformats.org/drawingml/2006/main" xmlns:r="http://schemas.openxmlformats.org/officeDocument/2006/relationships" xmlns:p="http://schemas.openxmlformats.org/presentationml/2006/main">
+  <p:cSld>
+    <p:spTree>
+      <p:nvGrpSpPr>
+        <p:cNvPr id="1" name=""/>
+        <p:cNvGrpSpPr/>
+        <p:nvPr/>
+      </p:nvGrpSpPr>
+      <p:grpSpPr>
+        <a:xfrm>
+          <a:off x="0" y="0"/>
+          <a:ext cx="0" cy="0"/>
+          <a:chOff x="0" y="0"/>
+          <a:chExt cx="0" cy="0"/>
+        </a:xfrm>
+      </p:grpSpPr>
+      <p:sp>
+        <p:nvSpPr>
+          <p:cNvPr id="2" name="Title 1"/>
+          <p:cNvSpPr>
+            <a:spLocks noGrp="1"/>
+          </p:cNvSpPr>
+          <p:nvPr>
+            <p:ph type="title"/>
+          </p:nvPr>
+        </p:nvSpPr>
+        <p:spPr/>
+        <p:txBody>
+          <a:bodyPr/>
+          <a:lstStyle/>
+          <a:p>
+            <a:r>
+              <a:rPr lang="en-US" dirty="0" smtClean="0"/>
+              <a:t>Questions?</a:t>
             </a:r>
             <a:endParaRPr lang="en-US" dirty="0"/>
           </a:p>
@@ -8516,6 +8981,95 @@
         </p:blipFill>
         <p:spPr>
           <a:xfrm>
+            <a:off x="4683125" y="3112294"/>
+            <a:ext cx="1609725" cy="2047875"/>
+          </a:xfrm>
+        </p:spPr>
+      </p:pic>
+    </p:spTree>
+    <p:extLst>
+      <p:ext uri="{BB962C8B-B14F-4D97-AF65-F5344CB8AC3E}">
+        <p14:creationId xmlns:p14="http://schemas.microsoft.com/office/powerpoint/2010/main" val="479884378"/>
+      </p:ext>
+    </p:extLst>
+  </p:cSld>
+  <p:clrMapOvr>
+    <a:masterClrMapping/>
+  </p:clrMapOvr>
+  <p:timing>
+    <p:tnLst>
+      <p:par>
+        <p:cTn id="1" dur="indefinite" restart="never" nodeType="tmRoot"/>
+      </p:par>
+    </p:tnLst>
+  </p:timing>
+</p:sld>
+</file>
+
+<file path=ppt/slides/slide9.xml><?xml version="1.0" encoding="utf-8"?>
+<p:sld xmlns:a="http://schemas.openxmlformats.org/drawingml/2006/main" xmlns:r="http://schemas.openxmlformats.org/officeDocument/2006/relationships" xmlns:p="http://schemas.openxmlformats.org/presentationml/2006/main">
+  <p:cSld>
+    <p:spTree>
+      <p:nvGrpSpPr>
+        <p:cNvPr id="1" name=""/>
+        <p:cNvGrpSpPr/>
+        <p:nvPr/>
+      </p:nvGrpSpPr>
+      <p:grpSpPr>
+        <a:xfrm>
+          <a:off x="0" y="0"/>
+          <a:ext cx="0" cy="0"/>
+          <a:chOff x="0" y="0"/>
+          <a:chExt cx="0" cy="0"/>
+        </a:xfrm>
+      </p:grpSpPr>
+      <p:sp>
+        <p:nvSpPr>
+          <p:cNvPr id="2" name="Title 1"/>
+          <p:cNvSpPr>
+            <a:spLocks noGrp="1"/>
+          </p:cNvSpPr>
+          <p:nvPr>
+            <p:ph type="title"/>
+          </p:nvPr>
+        </p:nvSpPr>
+        <p:spPr/>
+        <p:txBody>
+          <a:bodyPr/>
+          <a:lstStyle/>
+          <a:p>
+            <a:r>
+              <a:rPr lang="en-US" dirty="0" smtClean="0"/>
+              <a:t>Thank you!</a:t>
+            </a:r>
+            <a:endParaRPr lang="en-US" dirty="0"/>
+          </a:p>
+        </p:txBody>
+      </p:sp>
+      <p:pic>
+        <p:nvPicPr>
+          <p:cNvPr id="4" name="Content Placeholder 3"/>
+          <p:cNvPicPr>
+            <a:picLocks noGrp="1" noChangeAspect="1"/>
+          </p:cNvPicPr>
+          <p:nvPr>
+            <p:ph idx="1"/>
+          </p:nvPr>
+        </p:nvPicPr>
+        <p:blipFill>
+          <a:blip r:embed="rId2">
+            <a:extLst>
+              <a:ext uri="{28A0092B-C50C-407E-A947-70E740481C1C}">
+                <a14:useLocalDpi xmlns:a14="http://schemas.microsoft.com/office/drawing/2010/main" val="0"/>
+              </a:ext>
+            </a:extLst>
+          </a:blip>
+          <a:stretch>
+            <a:fillRect/>
+          </a:stretch>
+        </p:blipFill>
+        <p:spPr>
+          <a:xfrm>
             <a:off x="3049588" y="2516981"/>
             <a:ext cx="4876800" cy="3238500"/>
           </a:xfrm>
@@ -8531,6 +9085,13 @@
   <p:clrMapOvr>
     <a:masterClrMapping/>
   </p:clrMapOvr>
+  <p:timing>
+    <p:tnLst>
+      <p:par>
+        <p:cTn id="1" dur="indefinite" restart="never" nodeType="tmRoot"/>
+      </p:par>
+    </p:tnLst>
+  </p:timing>
 </p:sld>
 </file>
 

</xml_diff>